<commit_message>
Corrected small error in lec 12 slides
</commit_message>
<xml_diff>
--- a/Lec-12.pptx
+++ b/Lec-12.pptx
@@ -309,7 +309,7 @@
               <a:pPr>
                 <a:defRPr/>
               </a:pPr>
-              <a:t>9/1/2025</a:t>
+              <a:t>9/2/2025</a:t>
             </a:fld>
             <a:endParaRPr lang="en-US"/>
           </a:p>
@@ -11281,7 +11281,15 @@
             </a:pPr>
             <a:r>
               <a:rPr lang="en-IN" dirty="0"/>
-              <a:t>This is an active-low enable input multiplexer, i.e. when EN pin is made 0, output will select some input; when EN pin is 1, the multiplexer outputs 0</a:t>
+              <a:t>This is an active-low enable input multiplexer, i.e. when EN pin is made 0, output will select some input; when EN pin is 1, the multiplexer outputs 1 (</a:t>
+            </a:r>
+            <a:r>
+              <a:rPr lang="en-IN" b="1" i="1" dirty="0"/>
+              <a:t>independent of the input</a:t>
+            </a:r>
+            <a:r>
+              <a:rPr lang="en-IN" dirty="0"/>
+              <a:t>)</a:t>
             </a:r>
           </a:p>
           <a:p>

</xml_diff>

<commit_message>
Added multipliers to class 12
</commit_message>
<xml_diff>
--- a/Lec-12.pptx
+++ b/Lec-12.pptx
@@ -5,7 +5,7 @@
     <p:sldMasterId id="2147483648" r:id="rId1"/>
   </p:sldMasterIdLst>
   <p:notesMasterIdLst>
-    <p:notesMasterId r:id="rId22"/>
+    <p:notesMasterId r:id="rId28"/>
   </p:notesMasterIdLst>
   <p:sldIdLst>
     <p:sldId id="337" r:id="rId2"/>
@@ -28,6 +28,12 @@
     <p:sldId id="378" r:id="rId19"/>
     <p:sldId id="379" r:id="rId20"/>
     <p:sldId id="380" r:id="rId21"/>
+    <p:sldId id="381" r:id="rId22"/>
+    <p:sldId id="382" r:id="rId23"/>
+    <p:sldId id="383" r:id="rId24"/>
+    <p:sldId id="384" r:id="rId25"/>
+    <p:sldId id="385" r:id="rId26"/>
+    <p:sldId id="386" r:id="rId27"/>
   </p:sldIdLst>
   <p:sldSz cx="9144000" cy="6858000" type="screen4x3"/>
   <p:notesSz cx="6858000" cy="9144000"/>
@@ -309,7 +315,7 @@
               <a:pPr>
                 <a:defRPr/>
               </a:pPr>
-              <a:t>9/2/2025</a:t>
+              <a:t>9/3/2025</a:t>
             </a:fld>
             <a:endParaRPr lang="en-US"/>
           </a:p>
@@ -9854,6 +9860,728 @@
     <p:extLst>
       <p:ext uri="{BB962C8B-B14F-4D97-AF65-F5344CB8AC3E}">
         <p14:creationId xmlns:p14="http://schemas.microsoft.com/office/powerpoint/2010/main" val="3679680317"/>
+      </p:ext>
+    </p:extLst>
+  </p:cSld>
+  <p:clrMapOvr>
+    <a:masterClrMapping/>
+  </p:clrMapOvr>
+</p:sld>
+</file>
+
+<file path=ppt/slides/slide21.xml><?xml version="1.0" encoding="utf-8"?>
+<p:sld xmlns:a="http://schemas.openxmlformats.org/drawingml/2006/main" xmlns:r="http://schemas.openxmlformats.org/officeDocument/2006/relationships" xmlns:p="http://schemas.openxmlformats.org/presentationml/2006/main">
+  <p:cSld>
+    <p:spTree>
+      <p:nvGrpSpPr>
+        <p:cNvPr id="1" name=""/>
+        <p:cNvGrpSpPr/>
+        <p:nvPr/>
+      </p:nvGrpSpPr>
+      <p:grpSpPr>
+        <a:xfrm>
+          <a:off x="0" y="0"/>
+          <a:ext cx="0" cy="0"/>
+          <a:chOff x="0" y="0"/>
+          <a:chExt cx="0" cy="0"/>
+        </a:xfrm>
+      </p:grpSpPr>
+      <p:sp>
+        <p:nvSpPr>
+          <p:cNvPr id="3" name="Content Placeholder 2">
+            <a:extLst>
+              <a:ext uri="{FF2B5EF4-FFF2-40B4-BE49-F238E27FC236}">
+                <a16:creationId xmlns:a16="http://schemas.microsoft.com/office/drawing/2014/main" id="{D70EE090-7158-B090-12B3-77FF825ADE73}"/>
+              </a:ext>
+            </a:extLst>
+          </p:cNvPr>
+          <p:cNvSpPr>
+            <a:spLocks noGrp="1"/>
+          </p:cNvSpPr>
+          <p:nvPr>
+            <p:ph sz="quarter" idx="10"/>
+          </p:nvPr>
+        </p:nvSpPr>
+        <p:spPr>
+          <a:xfrm>
+            <a:off x="1447800" y="2857500"/>
+            <a:ext cx="6324600" cy="1143000"/>
+          </a:xfrm>
+        </p:spPr>
+        <p:txBody>
+          <a:bodyPr/>
+          <a:lstStyle/>
+          <a:p>
+            <a:r>
+              <a:rPr lang="en-US" dirty="0"/>
+              <a:t>Finishing up combinational circuits!</a:t>
+            </a:r>
+            <a:endParaRPr lang="en-IN" dirty="0"/>
+          </a:p>
+        </p:txBody>
+      </p:sp>
+    </p:spTree>
+    <p:extLst>
+      <p:ext uri="{BB962C8B-B14F-4D97-AF65-F5344CB8AC3E}">
+        <p14:creationId xmlns:p14="http://schemas.microsoft.com/office/powerpoint/2010/main" val="2308543728"/>
+      </p:ext>
+    </p:extLst>
+  </p:cSld>
+  <p:clrMapOvr>
+    <a:masterClrMapping/>
+  </p:clrMapOvr>
+</p:sld>
+</file>
+
+<file path=ppt/slides/slide22.xml><?xml version="1.0" encoding="utf-8"?>
+<p:sld xmlns:a="http://schemas.openxmlformats.org/drawingml/2006/main" xmlns:r="http://schemas.openxmlformats.org/officeDocument/2006/relationships" xmlns:p="http://schemas.openxmlformats.org/presentationml/2006/main">
+  <p:cSld>
+    <p:spTree>
+      <p:nvGrpSpPr>
+        <p:cNvPr id="1" name=""/>
+        <p:cNvGrpSpPr/>
+        <p:nvPr/>
+      </p:nvGrpSpPr>
+      <p:grpSpPr>
+        <a:xfrm>
+          <a:off x="0" y="0"/>
+          <a:ext cx="0" cy="0"/>
+          <a:chOff x="0" y="0"/>
+          <a:chExt cx="0" cy="0"/>
+        </a:xfrm>
+      </p:grpSpPr>
+      <p:sp>
+        <p:nvSpPr>
+          <p:cNvPr id="3" name="Content Placeholder 2">
+            <a:extLst>
+              <a:ext uri="{FF2B5EF4-FFF2-40B4-BE49-F238E27FC236}">
+                <a16:creationId xmlns:a16="http://schemas.microsoft.com/office/drawing/2014/main" id="{9B46CD5D-479C-3EA5-E948-3E87CDF5BFE5}"/>
+              </a:ext>
+            </a:extLst>
+          </p:cNvPr>
+          <p:cNvSpPr>
+            <a:spLocks noGrp="1"/>
+          </p:cNvSpPr>
+          <p:nvPr>
+            <p:ph sz="quarter" idx="10"/>
+          </p:nvPr>
+        </p:nvSpPr>
+        <p:spPr/>
+        <p:txBody>
+          <a:bodyPr/>
+          <a:lstStyle/>
+          <a:p>
+            <a:r>
+              <a:rPr lang="en-US" dirty="0"/>
+              <a:t>Multipliers</a:t>
+            </a:r>
+            <a:endParaRPr lang="en-IN" dirty="0"/>
+          </a:p>
+        </p:txBody>
+      </p:sp>
+      <p:pic>
+        <p:nvPicPr>
+          <p:cNvPr id="4" name="Picture 2">
+            <a:extLst>
+              <a:ext uri="{FF2B5EF4-FFF2-40B4-BE49-F238E27FC236}">
+                <a16:creationId xmlns:a16="http://schemas.microsoft.com/office/drawing/2014/main" id="{82D83C2B-38DC-8CF1-17B8-EA74D8D42DA5}"/>
+              </a:ext>
+            </a:extLst>
+          </p:cNvPr>
+          <p:cNvPicPr>
+            <a:picLocks noGrp="1" noChangeAspect="1" noChangeArrowheads="1"/>
+          </p:cNvPicPr>
+          <p:nvPr>
+            <p:ph idx="1"/>
+          </p:nvPr>
+        </p:nvPicPr>
+        <p:blipFill rotWithShape="1">
+          <a:blip r:embed="rId2">
+            <a:extLst>
+              <a:ext uri="{28A0092B-C50C-407E-A947-70E740481C1C}">
+                <a14:useLocalDpi xmlns:a14="http://schemas.microsoft.com/office/drawing/2010/main" val="0"/>
+              </a:ext>
+            </a:extLst>
+          </a:blip>
+          <a:srcRect t="12549"/>
+          <a:stretch>
+            <a:fillRect/>
+          </a:stretch>
+        </p:blipFill>
+        <p:spPr bwMode="auto">
+          <a:xfrm>
+            <a:off x="851013" y="1828800"/>
+            <a:ext cx="7441974" cy="3609462"/>
+          </a:xfrm>
+          <a:prstGeom prst="rect">
+            <a:avLst/>
+          </a:prstGeom>
+          <a:noFill/>
+          <a:ln>
+            <a:noFill/>
+          </a:ln>
+          <a:effectLst/>
+          <a:extLst>
+            <a:ext uri="{909E8E84-426E-40DD-AFC4-6F175D3DCCD1}">
+              <a14:hiddenFill xmlns:a14="http://schemas.microsoft.com/office/drawing/2010/main">
+                <a:solidFill>
+                  <a:schemeClr val="accent1"/>
+                </a:solidFill>
+              </a14:hiddenFill>
+            </a:ext>
+            <a:ext uri="{91240B29-F687-4F45-9708-019B960494DF}">
+              <a14:hiddenLine xmlns:a14="http://schemas.microsoft.com/office/drawing/2010/main" w="9525">
+                <a:solidFill>
+                  <a:schemeClr val="tx1"/>
+                </a:solidFill>
+                <a:miter lim="800000"/>
+                <a:headEnd/>
+                <a:tailEnd/>
+              </a14:hiddenLine>
+            </a:ext>
+            <a:ext uri="{AF507438-7753-43E0-B8FC-AC1667EBCBE1}">
+              <a14:hiddenEffects xmlns:a14="http://schemas.microsoft.com/office/drawing/2010/main">
+                <a:effectLst>
+                  <a:outerShdw dist="35921" dir="2700000" algn="ctr" rotWithShape="0">
+                    <a:schemeClr val="bg2"/>
+                  </a:outerShdw>
+                </a:effectLst>
+              </a14:hiddenEffects>
+            </a:ext>
+          </a:extLst>
+        </p:spPr>
+      </p:pic>
+    </p:spTree>
+    <p:extLst>
+      <p:ext uri="{BB962C8B-B14F-4D97-AF65-F5344CB8AC3E}">
+        <p14:creationId xmlns:p14="http://schemas.microsoft.com/office/powerpoint/2010/main" val="475690515"/>
+      </p:ext>
+    </p:extLst>
+  </p:cSld>
+  <p:clrMapOvr>
+    <a:masterClrMapping/>
+  </p:clrMapOvr>
+</p:sld>
+</file>
+
+<file path=ppt/slides/slide23.xml><?xml version="1.0" encoding="utf-8"?>
+<p:sld xmlns:a="http://schemas.openxmlformats.org/drawingml/2006/main" xmlns:r="http://schemas.openxmlformats.org/officeDocument/2006/relationships" xmlns:p="http://schemas.openxmlformats.org/presentationml/2006/main">
+  <p:cSld>
+    <p:spTree>
+      <p:nvGrpSpPr>
+        <p:cNvPr id="1" name=""/>
+        <p:cNvGrpSpPr/>
+        <p:nvPr/>
+      </p:nvGrpSpPr>
+      <p:grpSpPr>
+        <a:xfrm>
+          <a:off x="0" y="0"/>
+          <a:ext cx="0" cy="0"/>
+          <a:chOff x="0" y="0"/>
+          <a:chExt cx="0" cy="0"/>
+        </a:xfrm>
+      </p:grpSpPr>
+      <p:sp>
+        <p:nvSpPr>
+          <p:cNvPr id="3" name="Content Placeholder 2">
+            <a:extLst>
+              <a:ext uri="{FF2B5EF4-FFF2-40B4-BE49-F238E27FC236}">
+                <a16:creationId xmlns:a16="http://schemas.microsoft.com/office/drawing/2014/main" id="{5E4DDDEC-5333-78BF-22FC-33B9C96AF7EC}"/>
+              </a:ext>
+            </a:extLst>
+          </p:cNvPr>
+          <p:cNvSpPr>
+            <a:spLocks noGrp="1"/>
+          </p:cNvSpPr>
+          <p:nvPr>
+            <p:ph sz="quarter" idx="10"/>
+          </p:nvPr>
+        </p:nvSpPr>
+        <p:spPr/>
+        <p:txBody>
+          <a:bodyPr/>
+          <a:lstStyle/>
+          <a:p>
+            <a:r>
+              <a:rPr lang="en-US" dirty="0"/>
+              <a:t>Binary multiplication</a:t>
+            </a:r>
+            <a:endParaRPr lang="en-IN" dirty="0"/>
+          </a:p>
+        </p:txBody>
+      </p:sp>
+      <p:pic>
+        <p:nvPicPr>
+          <p:cNvPr id="4" name="Picture 2">
+            <a:extLst>
+              <a:ext uri="{FF2B5EF4-FFF2-40B4-BE49-F238E27FC236}">
+                <a16:creationId xmlns:a16="http://schemas.microsoft.com/office/drawing/2014/main" id="{BB3C517D-4E7C-36B0-D420-4C32B51144F2}"/>
+              </a:ext>
+            </a:extLst>
+          </p:cNvPr>
+          <p:cNvPicPr>
+            <a:picLocks noGrp="1" noChangeAspect="1" noChangeArrowheads="1"/>
+          </p:cNvPicPr>
+          <p:nvPr>
+            <p:ph idx="1"/>
+          </p:nvPr>
+        </p:nvPicPr>
+        <p:blipFill rotWithShape="1">
+          <a:blip r:embed="rId2">
+            <a:extLst>
+              <a:ext uri="{28A0092B-C50C-407E-A947-70E740481C1C}">
+                <a14:useLocalDpi xmlns:a14="http://schemas.microsoft.com/office/drawing/2010/main" val="0"/>
+              </a:ext>
+            </a:extLst>
+          </a:blip>
+          <a:srcRect t="15812"/>
+          <a:stretch>
+            <a:fillRect/>
+          </a:stretch>
+        </p:blipFill>
+        <p:spPr bwMode="auto">
+          <a:xfrm>
+            <a:off x="723900" y="1752600"/>
+            <a:ext cx="7696200" cy="4299551"/>
+          </a:xfrm>
+          <a:prstGeom prst="rect">
+            <a:avLst/>
+          </a:prstGeom>
+          <a:noFill/>
+          <a:ln>
+            <a:noFill/>
+          </a:ln>
+          <a:effectLst/>
+          <a:extLst>
+            <a:ext uri="{909E8E84-426E-40DD-AFC4-6F175D3DCCD1}">
+              <a14:hiddenFill xmlns:a14="http://schemas.microsoft.com/office/drawing/2010/main">
+                <a:solidFill>
+                  <a:schemeClr val="accent1"/>
+                </a:solidFill>
+              </a14:hiddenFill>
+            </a:ext>
+            <a:ext uri="{91240B29-F687-4F45-9708-019B960494DF}">
+              <a14:hiddenLine xmlns:a14="http://schemas.microsoft.com/office/drawing/2010/main" w="9525">
+                <a:solidFill>
+                  <a:schemeClr val="tx1"/>
+                </a:solidFill>
+                <a:miter lim="800000"/>
+                <a:headEnd/>
+                <a:tailEnd/>
+              </a14:hiddenLine>
+            </a:ext>
+            <a:ext uri="{AF507438-7753-43E0-B8FC-AC1667EBCBE1}">
+              <a14:hiddenEffects xmlns:a14="http://schemas.microsoft.com/office/drawing/2010/main">
+                <a:effectLst>
+                  <a:outerShdw dist="35921" dir="2700000" algn="ctr" rotWithShape="0">
+                    <a:schemeClr val="bg2"/>
+                  </a:outerShdw>
+                </a:effectLst>
+              </a14:hiddenEffects>
+            </a:ext>
+          </a:extLst>
+        </p:spPr>
+      </p:pic>
+    </p:spTree>
+    <p:extLst>
+      <p:ext uri="{BB962C8B-B14F-4D97-AF65-F5344CB8AC3E}">
+        <p14:creationId xmlns:p14="http://schemas.microsoft.com/office/powerpoint/2010/main" val="1797247066"/>
+      </p:ext>
+    </p:extLst>
+  </p:cSld>
+  <p:clrMapOvr>
+    <a:masterClrMapping/>
+  </p:clrMapOvr>
+</p:sld>
+</file>
+
+<file path=ppt/slides/slide24.xml><?xml version="1.0" encoding="utf-8"?>
+<p:sld xmlns:a="http://schemas.openxmlformats.org/drawingml/2006/main" xmlns:r="http://schemas.openxmlformats.org/officeDocument/2006/relationships" xmlns:p="http://schemas.openxmlformats.org/presentationml/2006/main">
+  <p:cSld>
+    <p:spTree>
+      <p:nvGrpSpPr>
+        <p:cNvPr id="1" name=""/>
+        <p:cNvGrpSpPr/>
+        <p:nvPr/>
+      </p:nvGrpSpPr>
+      <p:grpSpPr>
+        <a:xfrm>
+          <a:off x="0" y="0"/>
+          <a:ext cx="0" cy="0"/>
+          <a:chOff x="0" y="0"/>
+          <a:chExt cx="0" cy="0"/>
+        </a:xfrm>
+      </p:grpSpPr>
+      <p:sp>
+        <p:nvSpPr>
+          <p:cNvPr id="3" name="Content Placeholder 2">
+            <a:extLst>
+              <a:ext uri="{FF2B5EF4-FFF2-40B4-BE49-F238E27FC236}">
+                <a16:creationId xmlns:a16="http://schemas.microsoft.com/office/drawing/2014/main" id="{6F22F287-CC26-9CB2-6966-47DD136BE7BB}"/>
+              </a:ext>
+            </a:extLst>
+          </p:cNvPr>
+          <p:cNvSpPr>
+            <a:spLocks noGrp="1"/>
+          </p:cNvSpPr>
+          <p:nvPr>
+            <p:ph sz="quarter" idx="10"/>
+          </p:nvPr>
+        </p:nvSpPr>
+        <p:spPr/>
+        <p:txBody>
+          <a:bodyPr/>
+          <a:lstStyle/>
+          <a:p>
+            <a:r>
+              <a:rPr lang="en-US" dirty="0"/>
+              <a:t>2 x 2 multiplication</a:t>
+            </a:r>
+            <a:endParaRPr lang="en-IN" dirty="0"/>
+          </a:p>
+        </p:txBody>
+      </p:sp>
+      <p:pic>
+        <p:nvPicPr>
+          <p:cNvPr id="4" name="Picture 2">
+            <a:extLst>
+              <a:ext uri="{FF2B5EF4-FFF2-40B4-BE49-F238E27FC236}">
+                <a16:creationId xmlns:a16="http://schemas.microsoft.com/office/drawing/2014/main" id="{2EA61BE4-A91D-0FDA-D991-7B9FCD72213D}"/>
+              </a:ext>
+            </a:extLst>
+          </p:cNvPr>
+          <p:cNvPicPr>
+            <a:picLocks noGrp="1" noChangeAspect="1" noChangeArrowheads="1"/>
+          </p:cNvPicPr>
+          <p:nvPr>
+            <p:ph idx="1"/>
+          </p:nvPr>
+        </p:nvPicPr>
+        <p:blipFill rotWithShape="1">
+          <a:blip r:embed="rId2">
+            <a:extLst>
+              <a:ext uri="{28A0092B-C50C-407E-A947-70E740481C1C}">
+                <a14:useLocalDpi xmlns:a14="http://schemas.microsoft.com/office/drawing/2010/main" val="0"/>
+              </a:ext>
+            </a:extLst>
+          </a:blip>
+          <a:srcRect t="11293"/>
+          <a:stretch>
+            <a:fillRect/>
+          </a:stretch>
+        </p:blipFill>
+        <p:spPr bwMode="auto">
+          <a:xfrm>
+            <a:off x="880175" y="1676400"/>
+            <a:ext cx="7383649" cy="4343400"/>
+          </a:xfrm>
+          <a:prstGeom prst="rect">
+            <a:avLst/>
+          </a:prstGeom>
+          <a:noFill/>
+          <a:ln>
+            <a:noFill/>
+          </a:ln>
+          <a:effectLst/>
+          <a:extLst>
+            <a:ext uri="{909E8E84-426E-40DD-AFC4-6F175D3DCCD1}">
+              <a14:hiddenFill xmlns:a14="http://schemas.microsoft.com/office/drawing/2010/main">
+                <a:solidFill>
+                  <a:schemeClr val="accent1"/>
+                </a:solidFill>
+              </a14:hiddenFill>
+            </a:ext>
+            <a:ext uri="{91240B29-F687-4F45-9708-019B960494DF}">
+              <a14:hiddenLine xmlns:a14="http://schemas.microsoft.com/office/drawing/2010/main" w="9525">
+                <a:solidFill>
+                  <a:schemeClr val="tx1"/>
+                </a:solidFill>
+                <a:miter lim="800000"/>
+                <a:headEnd/>
+                <a:tailEnd/>
+              </a14:hiddenLine>
+            </a:ext>
+            <a:ext uri="{AF507438-7753-43E0-B8FC-AC1667EBCBE1}">
+              <a14:hiddenEffects xmlns:a14="http://schemas.microsoft.com/office/drawing/2010/main">
+                <a:effectLst>
+                  <a:outerShdw dist="35921" dir="2700000" algn="ctr" rotWithShape="0">
+                    <a:schemeClr val="bg2"/>
+                  </a:outerShdw>
+                </a:effectLst>
+              </a14:hiddenEffects>
+            </a:ext>
+          </a:extLst>
+        </p:spPr>
+      </p:pic>
+    </p:spTree>
+    <p:extLst>
+      <p:ext uri="{BB962C8B-B14F-4D97-AF65-F5344CB8AC3E}">
+        <p14:creationId xmlns:p14="http://schemas.microsoft.com/office/powerpoint/2010/main" val="14433478"/>
+      </p:ext>
+    </p:extLst>
+  </p:cSld>
+  <p:clrMapOvr>
+    <a:masterClrMapping/>
+  </p:clrMapOvr>
+</p:sld>
+</file>
+
+<file path=ppt/slides/slide25.xml><?xml version="1.0" encoding="utf-8"?>
+<p:sld xmlns:a="http://schemas.openxmlformats.org/drawingml/2006/main" xmlns:r="http://schemas.openxmlformats.org/officeDocument/2006/relationships" xmlns:p="http://schemas.openxmlformats.org/presentationml/2006/main">
+  <p:cSld>
+    <p:spTree>
+      <p:nvGrpSpPr>
+        <p:cNvPr id="1" name=""/>
+        <p:cNvGrpSpPr/>
+        <p:nvPr/>
+      </p:nvGrpSpPr>
+      <p:grpSpPr>
+        <a:xfrm>
+          <a:off x="0" y="0"/>
+          <a:ext cx="0" cy="0"/>
+          <a:chOff x="0" y="0"/>
+          <a:chExt cx="0" cy="0"/>
+        </a:xfrm>
+      </p:grpSpPr>
+      <p:sp>
+        <p:nvSpPr>
+          <p:cNvPr id="3" name="Content Placeholder 2">
+            <a:extLst>
+              <a:ext uri="{FF2B5EF4-FFF2-40B4-BE49-F238E27FC236}">
+                <a16:creationId xmlns:a16="http://schemas.microsoft.com/office/drawing/2014/main" id="{6B03C40B-4F61-B292-CD70-8CAD58EA9C06}"/>
+              </a:ext>
+            </a:extLst>
+          </p:cNvPr>
+          <p:cNvSpPr>
+            <a:spLocks noGrp="1"/>
+          </p:cNvSpPr>
+          <p:nvPr>
+            <p:ph sz="quarter" idx="10"/>
+          </p:nvPr>
+        </p:nvSpPr>
+        <p:spPr/>
+        <p:txBody>
+          <a:bodyPr/>
+          <a:lstStyle/>
+          <a:p>
+            <a:r>
+              <a:rPr lang="en-US" dirty="0"/>
+              <a:t>2 x 2 multiplication</a:t>
+            </a:r>
+            <a:endParaRPr lang="en-IN" dirty="0"/>
+          </a:p>
+          <a:p>
+            <a:endParaRPr lang="en-IN" dirty="0"/>
+          </a:p>
+        </p:txBody>
+      </p:sp>
+      <p:pic>
+        <p:nvPicPr>
+          <p:cNvPr id="4" name="Picture 2">
+            <a:extLst>
+              <a:ext uri="{FF2B5EF4-FFF2-40B4-BE49-F238E27FC236}">
+                <a16:creationId xmlns:a16="http://schemas.microsoft.com/office/drawing/2014/main" id="{A0021F1B-E129-1958-424C-B47EEB3C729C}"/>
+              </a:ext>
+            </a:extLst>
+          </p:cNvPr>
+          <p:cNvPicPr>
+            <a:picLocks noGrp="1" noChangeAspect="1" noChangeArrowheads="1"/>
+          </p:cNvPicPr>
+          <p:nvPr>
+            <p:ph idx="1"/>
+          </p:nvPr>
+        </p:nvPicPr>
+        <p:blipFill rotWithShape="1">
+          <a:blip r:embed="rId2">
+            <a:extLst>
+              <a:ext uri="{28A0092B-C50C-407E-A947-70E740481C1C}">
+                <a14:useLocalDpi xmlns:a14="http://schemas.microsoft.com/office/drawing/2010/main" val="0"/>
+              </a:ext>
+            </a:extLst>
+          </a:blip>
+          <a:srcRect t="12787"/>
+          <a:stretch>
+            <a:fillRect/>
+          </a:stretch>
+        </p:blipFill>
+        <p:spPr bwMode="auto">
+          <a:xfrm>
+            <a:off x="530369" y="1828800"/>
+            <a:ext cx="8083261" cy="4114800"/>
+          </a:xfrm>
+          <a:prstGeom prst="rect">
+            <a:avLst/>
+          </a:prstGeom>
+          <a:noFill/>
+          <a:ln>
+            <a:noFill/>
+          </a:ln>
+          <a:effectLst/>
+          <a:extLst>
+            <a:ext uri="{909E8E84-426E-40DD-AFC4-6F175D3DCCD1}">
+              <a14:hiddenFill xmlns:a14="http://schemas.microsoft.com/office/drawing/2010/main">
+                <a:solidFill>
+                  <a:schemeClr val="accent1"/>
+                </a:solidFill>
+              </a14:hiddenFill>
+            </a:ext>
+            <a:ext uri="{91240B29-F687-4F45-9708-019B960494DF}">
+              <a14:hiddenLine xmlns:a14="http://schemas.microsoft.com/office/drawing/2010/main" w="9525">
+                <a:solidFill>
+                  <a:schemeClr val="tx1"/>
+                </a:solidFill>
+                <a:miter lim="800000"/>
+                <a:headEnd/>
+                <a:tailEnd/>
+              </a14:hiddenLine>
+            </a:ext>
+            <a:ext uri="{AF507438-7753-43E0-B8FC-AC1667EBCBE1}">
+              <a14:hiddenEffects xmlns:a14="http://schemas.microsoft.com/office/drawing/2010/main">
+                <a:effectLst>
+                  <a:outerShdw dist="35921" dir="2700000" algn="ctr" rotWithShape="0">
+                    <a:schemeClr val="bg2"/>
+                  </a:outerShdw>
+                </a:effectLst>
+              </a14:hiddenEffects>
+            </a:ext>
+          </a:extLst>
+        </p:spPr>
+      </p:pic>
+    </p:spTree>
+    <p:extLst>
+      <p:ext uri="{BB962C8B-B14F-4D97-AF65-F5344CB8AC3E}">
+        <p14:creationId xmlns:p14="http://schemas.microsoft.com/office/powerpoint/2010/main" val="1032953255"/>
+      </p:ext>
+    </p:extLst>
+  </p:cSld>
+  <p:clrMapOvr>
+    <a:masterClrMapping/>
+  </p:clrMapOvr>
+</p:sld>
+</file>
+
+<file path=ppt/slides/slide26.xml><?xml version="1.0" encoding="utf-8"?>
+<p:sld xmlns:a="http://schemas.openxmlformats.org/drawingml/2006/main" xmlns:r="http://schemas.openxmlformats.org/officeDocument/2006/relationships" xmlns:p="http://schemas.openxmlformats.org/presentationml/2006/main">
+  <p:cSld>
+    <p:spTree>
+      <p:nvGrpSpPr>
+        <p:cNvPr id="1" name=""/>
+        <p:cNvGrpSpPr/>
+        <p:nvPr/>
+      </p:nvGrpSpPr>
+      <p:grpSpPr>
+        <a:xfrm>
+          <a:off x="0" y="0"/>
+          <a:ext cx="0" cy="0"/>
+          <a:chOff x="0" y="0"/>
+          <a:chExt cx="0" cy="0"/>
+        </a:xfrm>
+      </p:grpSpPr>
+      <p:sp>
+        <p:nvSpPr>
+          <p:cNvPr id="3" name="Content Placeholder 2">
+            <a:extLst>
+              <a:ext uri="{FF2B5EF4-FFF2-40B4-BE49-F238E27FC236}">
+                <a16:creationId xmlns:a16="http://schemas.microsoft.com/office/drawing/2014/main" id="{A9EDCED2-A095-A594-DF07-308FBF1F6833}"/>
+              </a:ext>
+            </a:extLst>
+          </p:cNvPr>
+          <p:cNvSpPr>
+            <a:spLocks noGrp="1"/>
+          </p:cNvSpPr>
+          <p:nvPr>
+            <p:ph sz="quarter" idx="10"/>
+          </p:nvPr>
+        </p:nvSpPr>
+        <p:spPr/>
+        <p:txBody>
+          <a:bodyPr/>
+          <a:lstStyle/>
+          <a:p>
+            <a:r>
+              <a:rPr lang="en-US" dirty="0"/>
+              <a:t>4 x 4 multiplication</a:t>
+            </a:r>
+            <a:endParaRPr lang="en-IN" dirty="0"/>
+          </a:p>
+        </p:txBody>
+      </p:sp>
+      <p:pic>
+        <p:nvPicPr>
+          <p:cNvPr id="4" name="Picture 2">
+            <a:extLst>
+              <a:ext uri="{FF2B5EF4-FFF2-40B4-BE49-F238E27FC236}">
+                <a16:creationId xmlns:a16="http://schemas.microsoft.com/office/drawing/2014/main" id="{451F25BC-2F7B-70AC-2165-398F6D16F5F1}"/>
+              </a:ext>
+            </a:extLst>
+          </p:cNvPr>
+          <p:cNvPicPr>
+            <a:picLocks noGrp="1" noChangeAspect="1" noChangeArrowheads="1"/>
+          </p:cNvPicPr>
+          <p:nvPr>
+            <p:ph idx="1"/>
+          </p:nvPr>
+        </p:nvPicPr>
+        <p:blipFill rotWithShape="1">
+          <a:blip r:embed="rId2">
+            <a:extLst>
+              <a:ext uri="{28A0092B-C50C-407E-A947-70E740481C1C}">
+                <a14:useLocalDpi xmlns:a14="http://schemas.microsoft.com/office/drawing/2010/main" val="0"/>
+              </a:ext>
+            </a:extLst>
+          </a:blip>
+          <a:srcRect t="10768"/>
+          <a:stretch>
+            <a:fillRect/>
+          </a:stretch>
+        </p:blipFill>
+        <p:spPr bwMode="auto">
+          <a:xfrm>
+            <a:off x="647700" y="1524000"/>
+            <a:ext cx="7848600" cy="4768731"/>
+          </a:xfrm>
+          <a:prstGeom prst="rect">
+            <a:avLst/>
+          </a:prstGeom>
+          <a:noFill/>
+          <a:ln>
+            <a:noFill/>
+          </a:ln>
+          <a:effectLst/>
+          <a:extLst>
+            <a:ext uri="{909E8E84-426E-40DD-AFC4-6F175D3DCCD1}">
+              <a14:hiddenFill xmlns:a14="http://schemas.microsoft.com/office/drawing/2010/main">
+                <a:solidFill>
+                  <a:schemeClr val="accent1"/>
+                </a:solidFill>
+              </a14:hiddenFill>
+            </a:ext>
+            <a:ext uri="{91240B29-F687-4F45-9708-019B960494DF}">
+              <a14:hiddenLine xmlns:a14="http://schemas.microsoft.com/office/drawing/2010/main" w="9525">
+                <a:solidFill>
+                  <a:schemeClr val="tx1"/>
+                </a:solidFill>
+                <a:miter lim="800000"/>
+                <a:headEnd/>
+                <a:tailEnd/>
+              </a14:hiddenLine>
+            </a:ext>
+            <a:ext uri="{AF507438-7753-43E0-B8FC-AC1667EBCBE1}">
+              <a14:hiddenEffects xmlns:a14="http://schemas.microsoft.com/office/drawing/2010/main">
+                <a:effectLst>
+                  <a:outerShdw dist="35921" dir="2700000" algn="ctr" rotWithShape="0">
+                    <a:schemeClr val="bg2"/>
+                  </a:outerShdw>
+                </a:effectLst>
+              </a14:hiddenEffects>
+            </a:ext>
+          </a:extLst>
+        </p:spPr>
+      </p:pic>
+    </p:spTree>
+    <p:extLst>
+      <p:ext uri="{BB962C8B-B14F-4D97-AF65-F5344CB8AC3E}">
+        <p14:creationId xmlns:p14="http://schemas.microsoft.com/office/powerpoint/2010/main" val="1966147689"/>
       </p:ext>
     </p:extLst>
   </p:cSld>

</xml_diff>